<commit_message>
Replaced images in newtons_law.tex
Replaced several images that were old and pixelated.  Also made changes to formatting and image sizes, and made minor edits to the text.
</commit_message>
<xml_diff>
--- a/StudentGuideModule1/newtons_laws/newtons_laws_fig1_new.pptx
+++ b/StudentGuideModule1/newtons_laws/newtons_laws_fig1_new.pptx
@@ -4,6 +4,9 @@
   <p:sldMasterIdLst>
     <p:sldMasterId id="2147483648" r:id="rId1"/>
   </p:sldMasterIdLst>
+  <p:notesMasterIdLst>
+    <p:notesMasterId r:id="rId3"/>
+  </p:notesMasterIdLst>
   <p:sldIdLst>
     <p:sldId id="256" r:id="rId2"/>
   </p:sldIdLst>
@@ -123,6 +126,440 @@
 </p:presentation>
 </file>
 
+<file path=ppt/notesMasters/notesMaster1.xml><?xml version="1.0" encoding="utf-8"?>
+<p:notesMaster xmlns:a="http://schemas.openxmlformats.org/drawingml/2006/main" xmlns:r="http://schemas.openxmlformats.org/officeDocument/2006/relationships" xmlns:p="http://schemas.openxmlformats.org/presentationml/2006/main">
+  <p:cSld>
+    <p:bg>
+      <p:bgRef idx="1001">
+        <a:schemeClr val="bg1"/>
+      </p:bgRef>
+    </p:bg>
+    <p:spTree>
+      <p:nvGrpSpPr>
+        <p:cNvPr id="1" name=""/>
+        <p:cNvGrpSpPr/>
+        <p:nvPr/>
+      </p:nvGrpSpPr>
+      <p:grpSpPr>
+        <a:xfrm>
+          <a:off x="0" y="0"/>
+          <a:ext cx="0" cy="0"/>
+          <a:chOff x="0" y="0"/>
+          <a:chExt cx="0" cy="0"/>
+        </a:xfrm>
+      </p:grpSpPr>
+      <p:sp>
+        <p:nvSpPr>
+          <p:cNvPr id="2" name="Header Placeholder 1"/>
+          <p:cNvSpPr>
+            <a:spLocks noGrp="1"/>
+          </p:cNvSpPr>
+          <p:nvPr>
+            <p:ph type="hdr" sz="quarter"/>
+          </p:nvPr>
+        </p:nvSpPr>
+        <p:spPr>
+          <a:xfrm>
+            <a:off x="0" y="0"/>
+            <a:ext cx="2971800" cy="458788"/>
+          </a:xfrm>
+          <a:prstGeom prst="rect">
+            <a:avLst/>
+          </a:prstGeom>
+        </p:spPr>
+        <p:txBody>
+          <a:bodyPr vert="horz" lIns="91440" tIns="45720" rIns="91440" bIns="45720" rtlCol="0"/>
+          <a:lstStyle>
+            <a:lvl1pPr algn="l">
+              <a:defRPr sz="1200"/>
+            </a:lvl1pPr>
+          </a:lstStyle>
+          <a:p>
+            <a:endParaRPr lang="en-US"/>
+          </a:p>
+        </p:txBody>
+      </p:sp>
+      <p:sp>
+        <p:nvSpPr>
+          <p:cNvPr id="3" name="Date Placeholder 2"/>
+          <p:cNvSpPr>
+            <a:spLocks noGrp="1"/>
+          </p:cNvSpPr>
+          <p:nvPr>
+            <p:ph type="dt" idx="1"/>
+          </p:nvPr>
+        </p:nvSpPr>
+        <p:spPr>
+          <a:xfrm>
+            <a:off x="3884613" y="0"/>
+            <a:ext cx="2971800" cy="458788"/>
+          </a:xfrm>
+          <a:prstGeom prst="rect">
+            <a:avLst/>
+          </a:prstGeom>
+        </p:spPr>
+        <p:txBody>
+          <a:bodyPr vert="horz" lIns="91440" tIns="45720" rIns="91440" bIns="45720" rtlCol="0"/>
+          <a:lstStyle>
+            <a:lvl1pPr algn="r">
+              <a:defRPr sz="1200"/>
+            </a:lvl1pPr>
+          </a:lstStyle>
+          <a:p>
+            <a:fld id="{BCC99F5F-E334-4176-A32C-03FBC32A7F09}" type="datetimeFigureOut">
+              <a:rPr lang="en-US" smtClean="0"/>
+              <a:t>10/5/2019</a:t>
+            </a:fld>
+            <a:endParaRPr lang="en-US"/>
+          </a:p>
+        </p:txBody>
+      </p:sp>
+      <p:sp>
+        <p:nvSpPr>
+          <p:cNvPr id="4" name="Slide Image Placeholder 3"/>
+          <p:cNvSpPr>
+            <a:spLocks noGrp="1" noRot="1" noChangeAspect="1"/>
+          </p:cNvSpPr>
+          <p:nvPr>
+            <p:ph type="sldImg" idx="2"/>
+          </p:nvPr>
+        </p:nvSpPr>
+        <p:spPr>
+          <a:xfrm>
+            <a:off x="1371600" y="1143000"/>
+            <a:ext cx="4114800" cy="3086100"/>
+          </a:xfrm>
+          <a:prstGeom prst="rect">
+            <a:avLst/>
+          </a:prstGeom>
+          <a:noFill/>
+          <a:ln w="12700">
+            <a:solidFill>
+              <a:prstClr val="black"/>
+            </a:solidFill>
+          </a:ln>
+        </p:spPr>
+        <p:txBody>
+          <a:bodyPr vert="horz" lIns="91440" tIns="45720" rIns="91440" bIns="45720" rtlCol="0" anchor="ctr"/>
+          <a:lstStyle/>
+          <a:p>
+            <a:endParaRPr lang="en-US"/>
+          </a:p>
+        </p:txBody>
+      </p:sp>
+      <p:sp>
+        <p:nvSpPr>
+          <p:cNvPr id="5" name="Notes Placeholder 4"/>
+          <p:cNvSpPr>
+            <a:spLocks noGrp="1"/>
+          </p:cNvSpPr>
+          <p:nvPr>
+            <p:ph type="body" sz="quarter" idx="3"/>
+          </p:nvPr>
+        </p:nvSpPr>
+        <p:spPr>
+          <a:xfrm>
+            <a:off x="685800" y="4400550"/>
+            <a:ext cx="5486400" cy="3600450"/>
+          </a:xfrm>
+          <a:prstGeom prst="rect">
+            <a:avLst/>
+          </a:prstGeom>
+        </p:spPr>
+        <p:txBody>
+          <a:bodyPr vert="horz" lIns="91440" tIns="45720" rIns="91440" bIns="45720" rtlCol="0"/>
+          <a:lstStyle/>
+          <a:p>
+            <a:pPr lvl="0"/>
+            <a:r>
+              <a:rPr lang="en-US" smtClean="0"/>
+              <a:t>Edit Master text styles</a:t>
+            </a:r>
+          </a:p>
+          <a:p>
+            <a:pPr lvl="1"/>
+            <a:r>
+              <a:rPr lang="en-US" smtClean="0"/>
+              <a:t>Second level</a:t>
+            </a:r>
+          </a:p>
+          <a:p>
+            <a:pPr lvl="2"/>
+            <a:r>
+              <a:rPr lang="en-US" smtClean="0"/>
+              <a:t>Third level</a:t>
+            </a:r>
+          </a:p>
+          <a:p>
+            <a:pPr lvl="3"/>
+            <a:r>
+              <a:rPr lang="en-US" smtClean="0"/>
+              <a:t>Fourth level</a:t>
+            </a:r>
+          </a:p>
+          <a:p>
+            <a:pPr lvl="4"/>
+            <a:r>
+              <a:rPr lang="en-US" smtClean="0"/>
+              <a:t>Fifth level</a:t>
+            </a:r>
+            <a:endParaRPr lang="en-US"/>
+          </a:p>
+        </p:txBody>
+      </p:sp>
+      <p:sp>
+        <p:nvSpPr>
+          <p:cNvPr id="6" name="Footer Placeholder 5"/>
+          <p:cNvSpPr>
+            <a:spLocks noGrp="1"/>
+          </p:cNvSpPr>
+          <p:nvPr>
+            <p:ph type="ftr" sz="quarter" idx="4"/>
+          </p:nvPr>
+        </p:nvSpPr>
+        <p:spPr>
+          <a:xfrm>
+            <a:off x="0" y="8685213"/>
+            <a:ext cx="2971800" cy="458787"/>
+          </a:xfrm>
+          <a:prstGeom prst="rect">
+            <a:avLst/>
+          </a:prstGeom>
+        </p:spPr>
+        <p:txBody>
+          <a:bodyPr vert="horz" lIns="91440" tIns="45720" rIns="91440" bIns="45720" rtlCol="0" anchor="b"/>
+          <a:lstStyle>
+            <a:lvl1pPr algn="l">
+              <a:defRPr sz="1200"/>
+            </a:lvl1pPr>
+          </a:lstStyle>
+          <a:p>
+            <a:endParaRPr lang="en-US"/>
+          </a:p>
+        </p:txBody>
+      </p:sp>
+      <p:sp>
+        <p:nvSpPr>
+          <p:cNvPr id="7" name="Slide Number Placeholder 6"/>
+          <p:cNvSpPr>
+            <a:spLocks noGrp="1"/>
+          </p:cNvSpPr>
+          <p:nvPr>
+            <p:ph type="sldNum" sz="quarter" idx="5"/>
+          </p:nvPr>
+        </p:nvSpPr>
+        <p:spPr>
+          <a:xfrm>
+            <a:off x="3884613" y="8685213"/>
+            <a:ext cx="2971800" cy="458787"/>
+          </a:xfrm>
+          <a:prstGeom prst="rect">
+            <a:avLst/>
+          </a:prstGeom>
+        </p:spPr>
+        <p:txBody>
+          <a:bodyPr vert="horz" lIns="91440" tIns="45720" rIns="91440" bIns="45720" rtlCol="0" anchor="b"/>
+          <a:lstStyle>
+            <a:lvl1pPr algn="r">
+              <a:defRPr sz="1200"/>
+            </a:lvl1pPr>
+          </a:lstStyle>
+          <a:p>
+            <a:fld id="{510819C2-604F-4C36-9588-DC4B0E528E48}" type="slidenum">
+              <a:rPr lang="en-US" smtClean="0"/>
+              <a:t>‹#›</a:t>
+            </a:fld>
+            <a:endParaRPr lang="en-US"/>
+          </a:p>
+        </p:txBody>
+      </p:sp>
+    </p:spTree>
+    <p:extLst>
+      <p:ext uri="{BB962C8B-B14F-4D97-AF65-F5344CB8AC3E}">
+        <p14:creationId xmlns:p14="http://schemas.microsoft.com/office/powerpoint/2010/main" val="1901800794"/>
+      </p:ext>
+    </p:extLst>
+  </p:cSld>
+  <p:clrMap bg1="lt1" tx1="dk1" bg2="lt2" tx2="dk2" accent1="accent1" accent2="accent2" accent3="accent3" accent4="accent4" accent5="accent5" accent6="accent6" hlink="hlink" folHlink="folHlink"/>
+  <p:notesStyle>
+    <a:lvl1pPr marL="0" algn="l" defTabSz="914400" rtl="0" eaLnBrk="1" latinLnBrk="0" hangingPunct="1">
+      <a:defRPr sz="1200" kern="1200">
+        <a:solidFill>
+          <a:schemeClr val="tx1"/>
+        </a:solidFill>
+        <a:latin typeface="+mn-lt"/>
+        <a:ea typeface="+mn-ea"/>
+        <a:cs typeface="+mn-cs"/>
+      </a:defRPr>
+    </a:lvl1pPr>
+    <a:lvl2pPr marL="457200" algn="l" defTabSz="914400" rtl="0" eaLnBrk="1" latinLnBrk="0" hangingPunct="1">
+      <a:defRPr sz="1200" kern="1200">
+        <a:solidFill>
+          <a:schemeClr val="tx1"/>
+        </a:solidFill>
+        <a:latin typeface="+mn-lt"/>
+        <a:ea typeface="+mn-ea"/>
+        <a:cs typeface="+mn-cs"/>
+      </a:defRPr>
+    </a:lvl2pPr>
+    <a:lvl3pPr marL="914400" algn="l" defTabSz="914400" rtl="0" eaLnBrk="1" latinLnBrk="0" hangingPunct="1">
+      <a:defRPr sz="1200" kern="1200">
+        <a:solidFill>
+          <a:schemeClr val="tx1"/>
+        </a:solidFill>
+        <a:latin typeface="+mn-lt"/>
+        <a:ea typeface="+mn-ea"/>
+        <a:cs typeface="+mn-cs"/>
+      </a:defRPr>
+    </a:lvl3pPr>
+    <a:lvl4pPr marL="1371600" algn="l" defTabSz="914400" rtl="0" eaLnBrk="1" latinLnBrk="0" hangingPunct="1">
+      <a:defRPr sz="1200" kern="1200">
+        <a:solidFill>
+          <a:schemeClr val="tx1"/>
+        </a:solidFill>
+        <a:latin typeface="+mn-lt"/>
+        <a:ea typeface="+mn-ea"/>
+        <a:cs typeface="+mn-cs"/>
+      </a:defRPr>
+    </a:lvl4pPr>
+    <a:lvl5pPr marL="1828800" algn="l" defTabSz="914400" rtl="0" eaLnBrk="1" latinLnBrk="0" hangingPunct="1">
+      <a:defRPr sz="1200" kern="1200">
+        <a:solidFill>
+          <a:schemeClr val="tx1"/>
+        </a:solidFill>
+        <a:latin typeface="+mn-lt"/>
+        <a:ea typeface="+mn-ea"/>
+        <a:cs typeface="+mn-cs"/>
+      </a:defRPr>
+    </a:lvl5pPr>
+    <a:lvl6pPr marL="2286000" algn="l" defTabSz="914400" rtl="0" eaLnBrk="1" latinLnBrk="0" hangingPunct="1">
+      <a:defRPr sz="1200" kern="1200">
+        <a:solidFill>
+          <a:schemeClr val="tx1"/>
+        </a:solidFill>
+        <a:latin typeface="+mn-lt"/>
+        <a:ea typeface="+mn-ea"/>
+        <a:cs typeface="+mn-cs"/>
+      </a:defRPr>
+    </a:lvl6pPr>
+    <a:lvl7pPr marL="2743200" algn="l" defTabSz="914400" rtl="0" eaLnBrk="1" latinLnBrk="0" hangingPunct="1">
+      <a:defRPr sz="1200" kern="1200">
+        <a:solidFill>
+          <a:schemeClr val="tx1"/>
+        </a:solidFill>
+        <a:latin typeface="+mn-lt"/>
+        <a:ea typeface="+mn-ea"/>
+        <a:cs typeface="+mn-cs"/>
+      </a:defRPr>
+    </a:lvl7pPr>
+    <a:lvl8pPr marL="3200400" algn="l" defTabSz="914400" rtl="0" eaLnBrk="1" latinLnBrk="0" hangingPunct="1">
+      <a:defRPr sz="1200" kern="1200">
+        <a:solidFill>
+          <a:schemeClr val="tx1"/>
+        </a:solidFill>
+        <a:latin typeface="+mn-lt"/>
+        <a:ea typeface="+mn-ea"/>
+        <a:cs typeface="+mn-cs"/>
+      </a:defRPr>
+    </a:lvl8pPr>
+    <a:lvl9pPr marL="3657600" algn="l" defTabSz="914400" rtl="0" eaLnBrk="1" latinLnBrk="0" hangingPunct="1">
+      <a:defRPr sz="1200" kern="1200">
+        <a:solidFill>
+          <a:schemeClr val="tx1"/>
+        </a:solidFill>
+        <a:latin typeface="+mn-lt"/>
+        <a:ea typeface="+mn-ea"/>
+        <a:cs typeface="+mn-cs"/>
+      </a:defRPr>
+    </a:lvl9pPr>
+  </p:notesStyle>
+</p:notesMaster>
+</file>
+
+<file path=ppt/notesSlides/notesSlide1.xml><?xml version="1.0" encoding="utf-8"?>
+<p:notes xmlns:a="http://schemas.openxmlformats.org/drawingml/2006/main" xmlns:r="http://schemas.openxmlformats.org/officeDocument/2006/relationships" xmlns:p="http://schemas.openxmlformats.org/presentationml/2006/main">
+  <p:cSld>
+    <p:spTree>
+      <p:nvGrpSpPr>
+        <p:cNvPr id="1" name=""/>
+        <p:cNvGrpSpPr/>
+        <p:nvPr/>
+      </p:nvGrpSpPr>
+      <p:grpSpPr>
+        <a:xfrm>
+          <a:off x="0" y="0"/>
+          <a:ext cx="0" cy="0"/>
+          <a:chOff x="0" y="0"/>
+          <a:chExt cx="0" cy="0"/>
+        </a:xfrm>
+      </p:grpSpPr>
+      <p:sp>
+        <p:nvSpPr>
+          <p:cNvPr id="2" name="Slide Image Placeholder 1"/>
+          <p:cNvSpPr>
+            <a:spLocks noGrp="1" noRot="1" noChangeAspect="1"/>
+          </p:cNvSpPr>
+          <p:nvPr>
+            <p:ph type="sldImg"/>
+          </p:nvPr>
+        </p:nvSpPr>
+        <p:spPr/>
+      </p:sp>
+      <p:sp>
+        <p:nvSpPr>
+          <p:cNvPr id="3" name="Notes Placeholder 2"/>
+          <p:cNvSpPr>
+            <a:spLocks noGrp="1"/>
+          </p:cNvSpPr>
+          <p:nvPr>
+            <p:ph type="body" idx="1"/>
+          </p:nvPr>
+        </p:nvSpPr>
+        <p:spPr/>
+        <p:txBody>
+          <a:bodyPr/>
+          <a:lstStyle/>
+          <a:p>
+            <a:endParaRPr lang="en-US"/>
+          </a:p>
+        </p:txBody>
+      </p:sp>
+      <p:sp>
+        <p:nvSpPr>
+          <p:cNvPr id="4" name="Slide Number Placeholder 3"/>
+          <p:cNvSpPr>
+            <a:spLocks noGrp="1"/>
+          </p:cNvSpPr>
+          <p:nvPr>
+            <p:ph type="sldNum" sz="quarter" idx="10"/>
+          </p:nvPr>
+        </p:nvSpPr>
+        <p:spPr/>
+        <p:txBody>
+          <a:bodyPr/>
+          <a:lstStyle/>
+          <a:p>
+            <a:fld id="{510819C2-604F-4C36-9588-DC4B0E528E48}" type="slidenum">
+              <a:rPr lang="en-US" smtClean="0"/>
+              <a:t>1</a:t>
+            </a:fld>
+            <a:endParaRPr lang="en-US"/>
+          </a:p>
+        </p:txBody>
+      </p:sp>
+    </p:spTree>
+    <p:extLst>
+      <p:ext uri="{BB962C8B-B14F-4D97-AF65-F5344CB8AC3E}">
+        <p14:creationId xmlns:p14="http://schemas.microsoft.com/office/powerpoint/2010/main" val="2787542995"/>
+      </p:ext>
+    </p:extLst>
+  </p:cSld>
+  <p:clrMapOvr>
+    <a:masterClrMapping/>
+  </p:clrMapOvr>
+</p:notes>
+</file>
+
 <file path=ppt/slideLayouts/slideLayout1.xml><?xml version="1.0" encoding="utf-8"?>
 <p:sldLayout xmlns:a="http://schemas.openxmlformats.org/drawingml/2006/main" xmlns:r="http://schemas.openxmlformats.org/officeDocument/2006/relationships" xmlns:p="http://schemas.openxmlformats.org/presentationml/2006/main" type="title" preserve="1">
   <p:cSld name="Title Slide">
@@ -302,7 +739,7 @@
           <a:p>
             <a:fld id="{2B81A30E-FEA9-42C1-95AD-B75AE3EF8DCE}" type="datetimeFigureOut">
               <a:rPr lang="en-US" smtClean="0"/>
-              <a:t>7/24/2019</a:t>
+              <a:t>10/5/2019</a:t>
             </a:fld>
             <a:endParaRPr lang="en-US"/>
           </a:p>
@@ -470,7 +907,7 @@
           <a:p>
             <a:fld id="{2B81A30E-FEA9-42C1-95AD-B75AE3EF8DCE}" type="datetimeFigureOut">
               <a:rPr lang="en-US" smtClean="0"/>
-              <a:t>7/24/2019</a:t>
+              <a:t>10/5/2019</a:t>
             </a:fld>
             <a:endParaRPr lang="en-US"/>
           </a:p>
@@ -648,7 +1085,7 @@
           <a:p>
             <a:fld id="{2B81A30E-FEA9-42C1-95AD-B75AE3EF8DCE}" type="datetimeFigureOut">
               <a:rPr lang="en-US" smtClean="0"/>
-              <a:t>7/24/2019</a:t>
+              <a:t>10/5/2019</a:t>
             </a:fld>
             <a:endParaRPr lang="en-US"/>
           </a:p>
@@ -816,7 +1253,7 @@
           <a:p>
             <a:fld id="{2B81A30E-FEA9-42C1-95AD-B75AE3EF8DCE}" type="datetimeFigureOut">
               <a:rPr lang="en-US" smtClean="0"/>
-              <a:t>7/24/2019</a:t>
+              <a:t>10/5/2019</a:t>
             </a:fld>
             <a:endParaRPr lang="en-US"/>
           </a:p>
@@ -1061,7 +1498,7 @@
           <a:p>
             <a:fld id="{2B81A30E-FEA9-42C1-95AD-B75AE3EF8DCE}" type="datetimeFigureOut">
               <a:rPr lang="en-US" smtClean="0"/>
-              <a:t>7/24/2019</a:t>
+              <a:t>10/5/2019</a:t>
             </a:fld>
             <a:endParaRPr lang="en-US"/>
           </a:p>
@@ -1346,7 +1783,7 @@
           <a:p>
             <a:fld id="{2B81A30E-FEA9-42C1-95AD-B75AE3EF8DCE}" type="datetimeFigureOut">
               <a:rPr lang="en-US" smtClean="0"/>
-              <a:t>7/24/2019</a:t>
+              <a:t>10/5/2019</a:t>
             </a:fld>
             <a:endParaRPr lang="en-US"/>
           </a:p>
@@ -1765,7 +2202,7 @@
           <a:p>
             <a:fld id="{2B81A30E-FEA9-42C1-95AD-B75AE3EF8DCE}" type="datetimeFigureOut">
               <a:rPr lang="en-US" smtClean="0"/>
-              <a:t>7/24/2019</a:t>
+              <a:t>10/5/2019</a:t>
             </a:fld>
             <a:endParaRPr lang="en-US"/>
           </a:p>
@@ -1882,7 +2319,7 @@
           <a:p>
             <a:fld id="{2B81A30E-FEA9-42C1-95AD-B75AE3EF8DCE}" type="datetimeFigureOut">
               <a:rPr lang="en-US" smtClean="0"/>
-              <a:t>7/24/2019</a:t>
+              <a:t>10/5/2019</a:t>
             </a:fld>
             <a:endParaRPr lang="en-US"/>
           </a:p>
@@ -1977,7 +2414,7 @@
           <a:p>
             <a:fld id="{2B81A30E-FEA9-42C1-95AD-B75AE3EF8DCE}" type="datetimeFigureOut">
               <a:rPr lang="en-US" smtClean="0"/>
-              <a:t>7/24/2019</a:t>
+              <a:t>10/5/2019</a:t>
             </a:fld>
             <a:endParaRPr lang="en-US"/>
           </a:p>
@@ -2252,7 +2689,7 @@
           <a:p>
             <a:fld id="{2B81A30E-FEA9-42C1-95AD-B75AE3EF8DCE}" type="datetimeFigureOut">
               <a:rPr lang="en-US" smtClean="0"/>
-              <a:t>7/24/2019</a:t>
+              <a:t>10/5/2019</a:t>
             </a:fld>
             <a:endParaRPr lang="en-US"/>
           </a:p>
@@ -2504,7 +2941,7 @@
           <a:p>
             <a:fld id="{2B81A30E-FEA9-42C1-95AD-B75AE3EF8DCE}" type="datetimeFigureOut">
               <a:rPr lang="en-US" smtClean="0"/>
-              <a:t>7/24/2019</a:t>
+              <a:t>10/5/2019</a:t>
             </a:fld>
             <a:endParaRPr lang="en-US"/>
           </a:p>
@@ -2715,7 +3152,7 @@
           <a:p>
             <a:fld id="{2B81A30E-FEA9-42C1-95AD-B75AE3EF8DCE}" type="datetimeFigureOut">
               <a:rPr lang="en-US" smtClean="0"/>
-              <a:t>7/24/2019</a:t>
+              <a:t>10/5/2019</a:t>
             </a:fld>
             <a:endParaRPr lang="en-US"/>
           </a:p>
@@ -3090,773 +3527,753 @@
           <a:chExt cx="0" cy="0"/>
         </a:xfrm>
       </p:grpSpPr>
-      <p:grpSp>
-        <p:nvGrpSpPr>
-          <p:cNvPr id="2" name="Group 1">
+      <p:pic>
+        <p:nvPicPr>
+          <p:cNvPr id="13" name="Picture 3" descr="C:\Users\mtrawick\Desktop\github\131\StudentGuideModule1\newtons_laws\momentum_transfer.tif">
             <a:extLst>
               <a:ext uri="{FF2B5EF4-FFF2-40B4-BE49-F238E27FC236}">
-                <a16:creationId xmlns:a16="http://schemas.microsoft.com/office/drawing/2014/main" id="{EFB68EA2-9AFF-4EAF-8C24-77220C28B892}"/>
+                <a16:creationId xmlns:a16="http://schemas.microsoft.com/office/drawing/2014/main" id="{60ABC673-9FB8-40BA-949F-7D1C0601E41F}"/>
               </a:ext>
             </a:extLst>
           </p:cNvPr>
-          <p:cNvGrpSpPr/>
+          <p:cNvPicPr>
+            <a:picLocks noChangeAspect="1" noChangeArrowheads="1"/>
+          </p:cNvPicPr>
           <p:nvPr/>
-        </p:nvGrpSpPr>
-        <p:grpSpPr>
-          <a:xfrm>
-            <a:off x="1905353" y="2471420"/>
-            <a:ext cx="3913493" cy="1155700"/>
-            <a:chOff x="1905353" y="2471420"/>
-            <a:chExt cx="3913493" cy="1155700"/>
-          </a:xfrm>
-        </p:grpSpPr>
-        <p:pic>
-          <p:nvPicPr>
-            <p:cNvPr id="13" name="Picture 3" descr="C:\Users\mtrawick\Desktop\github\131\StudentGuideModule1\newtons_laws\momentum_transfer.tif">
-              <a:extLst>
-                <a:ext uri="{FF2B5EF4-FFF2-40B4-BE49-F238E27FC236}">
-                  <a16:creationId xmlns:a16="http://schemas.microsoft.com/office/drawing/2014/main" id="{60ABC673-9FB8-40BA-949F-7D1C0601E41F}"/>
-                </a:ext>
-              </a:extLst>
-            </p:cNvPr>
-            <p:cNvPicPr>
-              <a:picLocks noChangeAspect="1" noChangeArrowheads="1"/>
-            </p:cNvPicPr>
-            <p:nvPr/>
-          </p:nvPicPr>
-          <p:blipFill rotWithShape="1">
-            <a:blip r:embed="rId2" cstate="print">
-              <a:extLst>
-                <a:ext uri="{28A0092B-C50C-407E-A947-70E740481C1C}">
-                  <a14:useLocalDpi xmlns:a14="http://schemas.microsoft.com/office/drawing/2010/main" val="0"/>
-                </a:ext>
-              </a:extLst>
-            </a:blip>
-            <a:srcRect l="57954" r="5852"/>
-            <a:stretch/>
-          </p:blipFill>
-          <p:spPr bwMode="auto">
-            <a:xfrm>
-              <a:off x="3703245" y="2474248"/>
-              <a:ext cx="1663435" cy="1152144"/>
-            </a:xfrm>
-            <a:prstGeom prst="rect">
-              <a:avLst/>
-            </a:prstGeom>
-            <a:noFill/>
+        </p:nvPicPr>
+        <p:blipFill rotWithShape="1">
+          <a:blip r:embed="rId3" cstate="print">
             <a:extLst>
-              <a:ext uri="{909E8E84-426E-40DD-AFC4-6F175D3DCCD1}">
-                <a14:hiddenFill xmlns:a14="http://schemas.microsoft.com/office/drawing/2010/main">
-                  <a:solidFill>
-                    <a:srgbClr val="FFFFFF"/>
-                  </a:solidFill>
-                </a14:hiddenFill>
+              <a:ext uri="{28A0092B-C50C-407E-A947-70E740481C1C}">
+                <a14:useLocalDpi xmlns:a14="http://schemas.microsoft.com/office/drawing/2010/main" val="0"/>
               </a:ext>
             </a:extLst>
-          </p:spPr>
-        </p:pic>
-        <p:pic>
-          <p:nvPicPr>
-            <p:cNvPr id="18" name="Picture 3" descr="C:\Users\mtrawick\Desktop\github\131\StudentGuideModule1\newtons_laws\momentum_transfer.tif">
-              <a:extLst>
-                <a:ext uri="{FF2B5EF4-FFF2-40B4-BE49-F238E27FC236}">
-                  <a16:creationId xmlns:a16="http://schemas.microsoft.com/office/drawing/2014/main" id="{1A449FD4-9E40-43FD-B185-9E95052D3714}"/>
-                </a:ext>
-              </a:extLst>
-            </p:cNvPr>
-            <p:cNvPicPr>
-              <a:picLocks noChangeAspect="1" noChangeArrowheads="1"/>
-            </p:cNvPicPr>
-            <p:nvPr/>
-          </p:nvPicPr>
-          <p:blipFill rotWithShape="1">
-            <a:blip r:embed="rId2" cstate="print">
-              <a:extLst>
-                <a:ext uri="{28A0092B-C50C-407E-A947-70E740481C1C}">
-                  <a14:useLocalDpi xmlns:a14="http://schemas.microsoft.com/office/drawing/2010/main" val="0"/>
-                </a:ext>
-              </a:extLst>
-            </a:blip>
-            <a:srcRect l="60985" r="3"/>
-            <a:stretch/>
-          </p:blipFill>
-          <p:spPr bwMode="auto">
-            <a:xfrm flipH="1">
-              <a:off x="1969787" y="2471420"/>
-              <a:ext cx="1798540" cy="1155700"/>
-            </a:xfrm>
-            <a:prstGeom prst="rect">
-              <a:avLst/>
-            </a:prstGeom>
-            <a:noFill/>
+          </a:blip>
+          <a:srcRect l="57954" r="5852"/>
+          <a:stretch/>
+        </p:blipFill>
+        <p:spPr bwMode="auto">
+          <a:xfrm>
+            <a:off x="3282420" y="2473586"/>
+            <a:ext cx="1274082" cy="882466"/>
+          </a:xfrm>
+          <a:prstGeom prst="rect">
+            <a:avLst/>
+          </a:prstGeom>
+          <a:noFill/>
+          <a:extLst>
+            <a:ext uri="{909E8E84-426E-40DD-AFC4-6F175D3DCCD1}">
+              <a14:hiddenFill xmlns:a14="http://schemas.microsoft.com/office/drawing/2010/main">
+                <a:solidFill>
+                  <a:srgbClr val="FFFFFF"/>
+                </a:solidFill>
+              </a14:hiddenFill>
+            </a:ext>
+          </a:extLst>
+        </p:spPr>
+      </p:pic>
+      <p:pic>
+        <p:nvPicPr>
+          <p:cNvPr id="18" name="Picture 3" descr="C:\Users\mtrawick\Desktop\github\131\StudentGuideModule1\newtons_laws\momentum_transfer.tif">
             <a:extLst>
-              <a:ext uri="{909E8E84-426E-40DD-AFC4-6F175D3DCCD1}">
-                <a14:hiddenFill xmlns:a14="http://schemas.microsoft.com/office/drawing/2010/main">
-                  <a:solidFill>
-                    <a:srgbClr val="FFFFFF"/>
-                  </a:solidFill>
-                </a14:hiddenFill>
+              <a:ext uri="{FF2B5EF4-FFF2-40B4-BE49-F238E27FC236}">
+                <a16:creationId xmlns:a16="http://schemas.microsoft.com/office/drawing/2014/main" id="{1A449FD4-9E40-43FD-B185-9E95052D3714}"/>
               </a:ext>
             </a:extLst>
-          </p:spPr>
-        </p:pic>
-        <p:pic>
-          <p:nvPicPr>
-            <p:cNvPr id="19" name="Picture 3" descr="C:\Users\mtrawick\Desktop\github\131\StudentGuideModule1\newtons_laws\momentum_transfer.tif">
-              <a:extLst>
-                <a:ext uri="{FF2B5EF4-FFF2-40B4-BE49-F238E27FC236}">
-                  <a16:creationId xmlns:a16="http://schemas.microsoft.com/office/drawing/2014/main" id="{03E4962E-7C34-4F8F-8200-FC613E458A6A}"/>
-                </a:ext>
-              </a:extLst>
-            </p:cNvPr>
-            <p:cNvPicPr>
-              <a:picLocks noChangeAspect="1" noChangeArrowheads="1"/>
-            </p:cNvPicPr>
-            <p:nvPr/>
-          </p:nvPicPr>
-          <p:blipFill rotWithShape="1">
-            <a:blip r:embed="rId2" cstate="print">
-              <a:extLst>
-                <a:ext uri="{28A0092B-C50C-407E-A947-70E740481C1C}">
-                  <a14:useLocalDpi xmlns:a14="http://schemas.microsoft.com/office/drawing/2010/main" val="0"/>
-                </a:ext>
-              </a:extLst>
-            </a:blip>
-            <a:srcRect l="54943" t="89513" r="37648"/>
-            <a:stretch/>
-          </p:blipFill>
-          <p:spPr bwMode="auto">
-            <a:xfrm flipH="1">
-              <a:off x="3255032" y="3505199"/>
-              <a:ext cx="341546" cy="121193"/>
-            </a:xfrm>
-            <a:prstGeom prst="rect">
-              <a:avLst/>
-            </a:prstGeom>
-            <a:noFill/>
+          </p:cNvPr>
+          <p:cNvPicPr>
+            <a:picLocks noChangeAspect="1" noChangeArrowheads="1"/>
+          </p:cNvPicPr>
+          <p:nvPr/>
+        </p:nvPicPr>
+        <p:blipFill rotWithShape="1">
+          <a:blip r:embed="rId4" cstate="print">
             <a:extLst>
-              <a:ext uri="{909E8E84-426E-40DD-AFC4-6F175D3DCCD1}">
-                <a14:hiddenFill xmlns:a14="http://schemas.microsoft.com/office/drawing/2010/main">
-                  <a:solidFill>
-                    <a:srgbClr val="FFFFFF"/>
-                  </a:solidFill>
-                </a14:hiddenFill>
+              <a:ext uri="{28A0092B-C50C-407E-A947-70E740481C1C}">
+                <a14:useLocalDpi xmlns:a14="http://schemas.microsoft.com/office/drawing/2010/main" val="0"/>
               </a:ext>
             </a:extLst>
-          </p:spPr>
-        </p:pic>
-        <mc:AlternateContent xmlns:mc="http://schemas.openxmlformats.org/markup-compatibility/2006">
-          <mc:Choice xmlns:a14="http://schemas.microsoft.com/office/drawing/2010/main" Requires="a14">
-            <p:sp>
-              <p:nvSpPr>
-                <p:cNvPr id="5" name="TextBox 4"/>
-                <p:cNvSpPr txBox="1"/>
-                <p:nvPr/>
-              </p:nvSpPr>
-              <p:spPr>
-                <a:xfrm>
-                  <a:off x="2640988" y="2991416"/>
-                  <a:ext cx="609598" cy="323165"/>
-                </a:xfrm>
-                <a:prstGeom prst="rect">
-                  <a:avLst/>
-                </a:prstGeom>
+          </a:blip>
+          <a:srcRect l="60985" r="3"/>
+          <a:stretch/>
+        </p:blipFill>
+        <p:spPr bwMode="auto">
+          <a:xfrm flipH="1">
+            <a:off x="1954705" y="2471420"/>
+            <a:ext cx="1377564" cy="885190"/>
+          </a:xfrm>
+          <a:prstGeom prst="rect">
+            <a:avLst/>
+          </a:prstGeom>
+          <a:noFill/>
+          <a:extLst>
+            <a:ext uri="{909E8E84-426E-40DD-AFC4-6F175D3DCCD1}">
+              <a14:hiddenFill xmlns:a14="http://schemas.microsoft.com/office/drawing/2010/main">
+                <a:solidFill>
+                  <a:srgbClr val="FFFFFF"/>
+                </a:solidFill>
+              </a14:hiddenFill>
+            </a:ext>
+          </a:extLst>
+        </p:spPr>
+      </p:pic>
+      <p:pic>
+        <p:nvPicPr>
+          <p:cNvPr id="19" name="Picture 3" descr="C:\Users\mtrawick\Desktop\github\131\StudentGuideModule1\newtons_laws\momentum_transfer.tif">
+            <a:extLst>
+              <a:ext uri="{FF2B5EF4-FFF2-40B4-BE49-F238E27FC236}">
+                <a16:creationId xmlns:a16="http://schemas.microsoft.com/office/drawing/2014/main" id="{03E4962E-7C34-4F8F-8200-FC613E458A6A}"/>
+              </a:ext>
+            </a:extLst>
+          </p:cNvPr>
+          <p:cNvPicPr>
+            <a:picLocks noChangeAspect="1" noChangeArrowheads="1"/>
+          </p:cNvPicPr>
+          <p:nvPr/>
+        </p:nvPicPr>
+        <p:blipFill rotWithShape="1">
+          <a:blip r:embed="rId5" cstate="print">
+            <a:extLst>
+              <a:ext uri="{28A0092B-C50C-407E-A947-70E740481C1C}">
+                <a14:useLocalDpi xmlns:a14="http://schemas.microsoft.com/office/drawing/2010/main" val="0"/>
+              </a:ext>
+            </a:extLst>
+          </a:blip>
+          <a:srcRect l="54943" t="89513" r="37648"/>
+          <a:stretch/>
+        </p:blipFill>
+        <p:spPr bwMode="auto">
+          <a:xfrm flipH="1">
+            <a:off x="2939118" y="3263227"/>
+            <a:ext cx="261602" cy="92826"/>
+          </a:xfrm>
+          <a:prstGeom prst="rect">
+            <a:avLst/>
+          </a:prstGeom>
+          <a:noFill/>
+          <a:extLst>
+            <a:ext uri="{909E8E84-426E-40DD-AFC4-6F175D3DCCD1}">
+              <a14:hiddenFill xmlns:a14="http://schemas.microsoft.com/office/drawing/2010/main">
+                <a:solidFill>
+                  <a:srgbClr val="FFFFFF"/>
+                </a:solidFill>
+              </a14:hiddenFill>
+            </a:ext>
+          </a:extLst>
+        </p:spPr>
+      </p:pic>
+      <mc:AlternateContent xmlns:mc="http://schemas.openxmlformats.org/markup-compatibility/2006">
+        <mc:Choice xmlns:a14="http://schemas.microsoft.com/office/drawing/2010/main" Requires="a14">
+          <p:sp>
+            <p:nvSpPr>
+              <p:cNvPr id="5" name="TextBox 4"/>
+              <p:cNvSpPr txBox="1"/>
+              <p:nvPr/>
+            </p:nvSpPr>
+            <p:spPr>
+              <a:xfrm>
+                <a:off x="2468801" y="2869703"/>
+                <a:ext cx="466912" cy="261610"/>
+              </a:xfrm>
+              <a:prstGeom prst="rect">
+                <a:avLst/>
+              </a:prstGeom>
+              <a:noFill/>
+              <a:ln w="12700">
                 <a:noFill/>
-                <a:ln w="12700">
-                  <a:noFill/>
-                </a:ln>
-              </p:spPr>
-              <p:txBody>
-                <a:bodyPr wrap="square" rtlCol="0">
-                  <a:spAutoFit/>
-                </a:bodyPr>
-                <a:lstStyle/>
-                <a:p>
-                  <a:pPr/>
-                  <a14:m>
-                    <m:oMathPara xmlns:m="http://schemas.openxmlformats.org/officeDocument/2006/math">
-                      <m:oMathParaPr>
-                        <m:jc m:val="centerGroup"/>
-                      </m:oMathParaPr>
-                      <m:oMath xmlns:m="http://schemas.openxmlformats.org/officeDocument/2006/math">
-                        <m:sSub>
-                          <m:sSubPr>
-                            <m:ctrlPr>
-                              <a:rPr lang="en-US" sz="1500" b="1" i="1" smtClean="0">
-                                <a:latin typeface="Cambria Math" panose="02040503050406030204" pitchFamily="18" charset="0"/>
-                              </a:rPr>
-                            </m:ctrlPr>
-                          </m:sSubPr>
-                          <m:e>
-                            <m:r>
-                              <a:rPr lang="en-US" sz="1500" b="1" i="1" smtClean="0">
-                                <a:latin typeface="Cambria Math" panose="02040503050406030204" pitchFamily="18" charset="0"/>
-                              </a:rPr>
-                              <m:t>𝒎</m:t>
-                            </m:r>
-                          </m:e>
-                          <m:sub>
-                            <m:r>
-                              <a:rPr lang="en-US" sz="1500" b="1" i="1" smtClean="0">
-                                <a:latin typeface="Cambria Math" panose="02040503050406030204" pitchFamily="18" charset="0"/>
-                              </a:rPr>
-                              <m:t>𝟏</m:t>
-                            </m:r>
-                          </m:sub>
-                        </m:sSub>
-                      </m:oMath>
-                    </m:oMathPara>
-                  </a14:m>
-                  <a:endParaRPr lang="en-US" sz="1500" b="1" dirty="0"/>
-                </a:p>
-              </p:txBody>
-            </p:sp>
-          </mc:Choice>
-          <mc:Fallback>
-            <p:sp>
-              <p:nvSpPr>
-                <p:cNvPr id="5" name="TextBox 4"/>
-                <p:cNvSpPr txBox="1">
-                  <a:spLocks noRot="1" noChangeAspect="1" noMove="1" noResize="1" noEditPoints="1" noAdjustHandles="1" noChangeArrowheads="1" noChangeShapeType="1" noTextEdit="1"/>
-                </p:cNvSpPr>
-                <p:nvPr/>
-              </p:nvSpPr>
-              <p:spPr>
-                <a:xfrm>
-                  <a:off x="2640988" y="2991416"/>
-                  <a:ext cx="609598" cy="323165"/>
-                </a:xfrm>
-                <a:prstGeom prst="rect">
-                  <a:avLst/>
-                </a:prstGeom>
-                <a:blipFill>
-                  <a:blip r:embed="rId3"/>
-                  <a:stretch>
-                    <a:fillRect/>
-                  </a:stretch>
-                </a:blipFill>
-                <a:ln w="12700">
-                  <a:noFill/>
-                </a:ln>
-              </p:spPr>
-              <p:txBody>
-                <a:bodyPr/>
-                <a:lstStyle/>
-                <a:p>
-                  <a:r>
-                    <a:rPr lang="en-US">
-                      <a:noFill/>
-                    </a:rPr>
-                    <a:t> </a:t>
-                  </a:r>
-                </a:p>
-              </p:txBody>
-            </p:sp>
-          </mc:Fallback>
-        </mc:AlternateContent>
-        <p:cxnSp>
-          <p:nvCxnSpPr>
-            <p:cNvPr id="8" name="Straight Arrow Connector 7"/>
-            <p:cNvCxnSpPr>
-              <a:cxnSpLocks/>
-            </p:cNvCxnSpPr>
-            <p:nvPr/>
-          </p:nvCxnSpPr>
-          <p:spPr>
-            <a:xfrm>
-              <a:off x="3288079" y="2977638"/>
-              <a:ext cx="485225" cy="0"/>
-            </a:xfrm>
-            <a:prstGeom prst="straightConnector1">
-              <a:avLst/>
-            </a:prstGeom>
-            <a:ln w="19050">
-              <a:solidFill>
-                <a:schemeClr val="tx1"/>
-              </a:solidFill>
-              <a:tailEnd type="triangle" w="lg" len="lg"/>
-            </a:ln>
-          </p:spPr>
-          <p:style>
-            <a:lnRef idx="1">
-              <a:schemeClr val="accent1"/>
-            </a:lnRef>
-            <a:fillRef idx="0">
-              <a:schemeClr val="accent1"/>
-            </a:fillRef>
-            <a:effectRef idx="0">
-              <a:schemeClr val="accent1"/>
-            </a:effectRef>
-            <a:fontRef idx="minor">
+              </a:ln>
+            </p:spPr>
+            <p:txBody>
+              <a:bodyPr wrap="square" rtlCol="0">
+                <a:spAutoFit/>
+              </a:bodyPr>
+              <a:lstStyle/>
+              <a:p>
+                <a:pPr/>
+                <a14:m>
+                  <m:oMathPara xmlns:m="http://schemas.openxmlformats.org/officeDocument/2006/math">
+                    <m:oMathParaPr>
+                      <m:jc m:val="centerGroup"/>
+                    </m:oMathParaPr>
+                    <m:oMath xmlns:m="http://schemas.openxmlformats.org/officeDocument/2006/math">
+                      <m:sSub>
+                        <m:sSubPr>
+                          <m:ctrlPr>
+                            <a:rPr lang="en-US" sz="1100" i="1" smtClean="0">
+                              <a:latin typeface="Cambria Math" panose="02040503050406030204" pitchFamily="18" charset="0"/>
+                            </a:rPr>
+                          </m:ctrlPr>
+                        </m:sSubPr>
+                        <m:e>
+                          <m:r>
+                            <a:rPr lang="en-US" sz="1100" b="0" i="1" smtClean="0">
+                              <a:latin typeface="Cambria Math" panose="02040503050406030204" pitchFamily="18" charset="0"/>
+                            </a:rPr>
+                            <m:t>𝑚</m:t>
+                          </m:r>
+                        </m:e>
+                        <m:sub>
+                          <m:r>
+                            <a:rPr lang="en-US" sz="1100" b="0" i="1" smtClean="0">
+                              <a:latin typeface="Cambria Math" panose="02040503050406030204" pitchFamily="18" charset="0"/>
+                            </a:rPr>
+                            <m:t>1</m:t>
+                          </m:r>
+                        </m:sub>
+                      </m:sSub>
+                    </m:oMath>
+                  </m:oMathPara>
+                </a14:m>
+                <a:endParaRPr lang="en-US" sz="1100" dirty="0"/>
+              </a:p>
+            </p:txBody>
+          </p:sp>
+        </mc:Choice>
+        <mc:Fallback>
+          <p:sp>
+            <p:nvSpPr>
+              <p:cNvPr id="5" name="TextBox 4"/>
+              <p:cNvSpPr txBox="1">
+                <a:spLocks noRot="1" noChangeAspect="1" noMove="1" noResize="1" noEditPoints="1" noAdjustHandles="1" noChangeArrowheads="1" noChangeShapeType="1" noTextEdit="1"/>
+              </p:cNvSpPr>
+              <p:nvPr/>
+            </p:nvSpPr>
+            <p:spPr>
+              <a:xfrm>
+                <a:off x="2468801" y="2869703"/>
+                <a:ext cx="466912" cy="261610"/>
+              </a:xfrm>
+              <a:prstGeom prst="rect">
+                <a:avLst/>
+              </a:prstGeom>
+              <a:blipFill>
+                <a:blip r:embed="rId6"/>
+                <a:stretch>
+                  <a:fillRect/>
+                </a:stretch>
+              </a:blipFill>
+              <a:ln w="12700">
+                <a:noFill/>
+              </a:ln>
+            </p:spPr>
+            <p:txBody>
+              <a:bodyPr/>
+              <a:lstStyle/>
+              <a:p>
+                <a:r>
+                  <a:rPr lang="en-US">
+                    <a:noFill/>
+                  </a:rPr>
+                  <a:t> </a:t>
+                </a:r>
+              </a:p>
+            </p:txBody>
+          </p:sp>
+        </mc:Fallback>
+      </mc:AlternateContent>
+      <p:cxnSp>
+        <p:nvCxnSpPr>
+          <p:cNvPr id="8" name="Straight Arrow Connector 7"/>
+          <p:cNvCxnSpPr>
+            <a:cxnSpLocks/>
+          </p:cNvCxnSpPr>
+          <p:nvPr/>
+        </p:nvCxnSpPr>
+        <p:spPr>
+          <a:xfrm>
+            <a:off x="2964430" y="2859150"/>
+            <a:ext cx="371650" cy="0"/>
+          </a:xfrm>
+          <a:prstGeom prst="straightConnector1">
+            <a:avLst/>
+          </a:prstGeom>
+          <a:ln w="19050">
+            <a:solidFill>
               <a:schemeClr val="tx1"/>
-            </a:fontRef>
-          </p:style>
-        </p:cxnSp>
-        <p:sp>
-          <p:nvSpPr>
-            <p:cNvPr id="14" name="TextBox 13"/>
-            <p:cNvSpPr txBox="1"/>
-            <p:nvPr/>
-          </p:nvSpPr>
-          <p:spPr>
-            <a:xfrm>
-              <a:off x="1905353" y="2560630"/>
-              <a:ext cx="1032635" cy="338554"/>
-            </a:xfrm>
-            <a:prstGeom prst="rect">
-              <a:avLst/>
-            </a:prstGeom>
+            </a:solidFill>
+            <a:headEnd type="none" w="med" len="med"/>
+            <a:tailEnd type="arrow" w="med" len="med"/>
+          </a:ln>
+        </p:spPr>
+        <p:style>
+          <a:lnRef idx="1">
+            <a:schemeClr val="accent1"/>
+          </a:lnRef>
+          <a:fillRef idx="0">
+            <a:schemeClr val="accent1"/>
+          </a:fillRef>
+          <a:effectRef idx="0">
+            <a:schemeClr val="accent1"/>
+          </a:effectRef>
+          <a:fontRef idx="minor">
+            <a:schemeClr val="tx1"/>
+          </a:fontRef>
+        </p:style>
+      </p:cxnSp>
+      <p:sp>
+        <p:nvSpPr>
+          <p:cNvPr id="14" name="TextBox 13"/>
+          <p:cNvSpPr txBox="1"/>
+          <p:nvPr/>
+        </p:nvSpPr>
+        <p:spPr>
+          <a:xfrm>
+            <a:off x="2359717" y="2473709"/>
+            <a:ext cx="654967" cy="261610"/>
+          </a:xfrm>
+          <a:prstGeom prst="rect">
+            <a:avLst/>
+          </a:prstGeom>
+          <a:noFill/>
+          <a:ln w="12700">
             <a:noFill/>
-            <a:ln w="12700">
+          </a:ln>
+        </p:spPr>
+        <p:txBody>
+          <a:bodyPr wrap="square" rtlCol="0">
+            <a:spAutoFit/>
+          </a:bodyPr>
+          <a:lstStyle/>
+          <a:p>
+            <a:r>
+              <a:rPr lang="en-US" sz="1100" dirty="0"/>
+              <a:t>object 1</a:t>
+            </a:r>
+          </a:p>
+        </p:txBody>
+      </p:sp>
+      <p:sp>
+        <p:nvSpPr>
+          <p:cNvPr id="15" name="TextBox 14"/>
+          <p:cNvSpPr txBox="1"/>
+          <p:nvPr/>
+        </p:nvSpPr>
+        <p:spPr>
+          <a:xfrm>
+            <a:off x="3687001" y="2473709"/>
+            <a:ext cx="790930" cy="309545"/>
+          </a:xfrm>
+          <a:prstGeom prst="rect">
+            <a:avLst/>
+          </a:prstGeom>
+          <a:noFill/>
+          <a:ln w="12700">
+            <a:noFill/>
+          </a:ln>
+        </p:spPr>
+        <p:txBody>
+          <a:bodyPr wrap="square" rtlCol="0">
+            <a:spAutoFit/>
+          </a:bodyPr>
+          <a:lstStyle/>
+          <a:p>
+            <a:r>
+              <a:rPr lang="en-US" sz="1100" dirty="0"/>
+              <a:t>object 2</a:t>
+            </a:r>
+          </a:p>
+        </p:txBody>
+      </p:sp>
+      <mc:AlternateContent xmlns:mc="http://schemas.openxmlformats.org/markup-compatibility/2006">
+        <mc:Choice xmlns:a14="http://schemas.microsoft.com/office/drawing/2010/main" Requires="a14">
+          <p:sp>
+            <p:nvSpPr>
+              <p:cNvPr id="20" name="TextBox 19">
+                <a:extLst>
+                  <a:ext uri="{FF2B5EF4-FFF2-40B4-BE49-F238E27FC236}">
+                    <a16:creationId xmlns:a16="http://schemas.microsoft.com/office/drawing/2014/main" id="{3F1B4565-C315-4893-BD40-74F1FFADD145}"/>
+                  </a:ext>
+                </a:extLst>
+              </p:cNvPr>
+              <p:cNvSpPr txBox="1"/>
+              <p:nvPr/>
+            </p:nvSpPr>
+            <p:spPr>
+              <a:xfrm>
+                <a:off x="3762361" y="2867793"/>
+                <a:ext cx="466912" cy="261610"/>
+              </a:xfrm>
+              <a:prstGeom prst="rect">
+                <a:avLst/>
+              </a:prstGeom>
               <a:noFill/>
-            </a:ln>
-          </p:spPr>
-          <p:txBody>
-            <a:bodyPr wrap="square" rtlCol="0">
-              <a:spAutoFit/>
-            </a:bodyPr>
-            <a:lstStyle/>
-            <a:p>
-              <a:r>
-                <a:rPr lang="en-US" sz="1600" dirty="0"/>
-                <a:t>object 1</a:t>
-              </a:r>
-            </a:p>
-          </p:txBody>
-        </p:sp>
-        <p:sp>
-          <p:nvSpPr>
-            <p:cNvPr id="15" name="TextBox 14"/>
-            <p:cNvSpPr txBox="1"/>
-            <p:nvPr/>
-          </p:nvSpPr>
-          <p:spPr>
-            <a:xfrm>
-              <a:off x="4786211" y="2560630"/>
-              <a:ext cx="1032635" cy="338554"/>
-            </a:xfrm>
-            <a:prstGeom prst="rect">
-              <a:avLst/>
-            </a:prstGeom>
-            <a:noFill/>
-            <a:ln w="12700">
+              <a:ln w="12700">
+                <a:noFill/>
+              </a:ln>
+            </p:spPr>
+            <p:txBody>
+              <a:bodyPr wrap="square" rtlCol="0">
+                <a:spAutoFit/>
+              </a:bodyPr>
+              <a:lstStyle/>
+              <a:p>
+                <a:pPr/>
+                <a14:m>
+                  <m:oMathPara xmlns:m="http://schemas.openxmlformats.org/officeDocument/2006/math">
+                    <m:oMathParaPr>
+                      <m:jc m:val="centerGroup"/>
+                    </m:oMathParaPr>
+                    <m:oMath xmlns:m="http://schemas.openxmlformats.org/officeDocument/2006/math">
+                      <m:sSub>
+                        <m:sSubPr>
+                          <m:ctrlPr>
+                            <a:rPr lang="en-US" sz="1100" i="1" smtClean="0">
+                              <a:latin typeface="Cambria Math" panose="02040503050406030204" pitchFamily="18" charset="0"/>
+                            </a:rPr>
+                          </m:ctrlPr>
+                        </m:sSubPr>
+                        <m:e>
+                          <m:r>
+                            <a:rPr lang="en-US" sz="1100" b="0" i="1" smtClean="0">
+                              <a:latin typeface="Cambria Math" panose="02040503050406030204" pitchFamily="18" charset="0"/>
+                            </a:rPr>
+                            <m:t>𝑚</m:t>
+                          </m:r>
+                        </m:e>
+                        <m:sub>
+                          <m:r>
+                            <a:rPr lang="en-US" sz="1100" b="0" i="1" smtClean="0">
+                              <a:latin typeface="Cambria Math" panose="02040503050406030204" pitchFamily="18" charset="0"/>
+                            </a:rPr>
+                            <m:t>2</m:t>
+                          </m:r>
+                        </m:sub>
+                      </m:sSub>
+                    </m:oMath>
+                  </m:oMathPara>
+                </a14:m>
+                <a:endParaRPr lang="en-US" sz="1100" dirty="0"/>
+              </a:p>
+            </p:txBody>
+          </p:sp>
+        </mc:Choice>
+        <mc:Fallback>
+          <p:sp>
+            <p:nvSpPr>
+              <p:cNvPr id="20" name="TextBox 19">
+                <a:extLst>
+                  <a:ext uri="{FF2B5EF4-FFF2-40B4-BE49-F238E27FC236}">
+                    <a16:creationId xmlns:a16="http://schemas.microsoft.com/office/drawing/2014/main" id="{3F1B4565-C315-4893-BD40-74F1FFADD145}"/>
+                  </a:ext>
+                </a:extLst>
+              </p:cNvPr>
+              <p:cNvSpPr txBox="1">
+                <a:spLocks noRot="1" noChangeAspect="1" noMove="1" noResize="1" noEditPoints="1" noAdjustHandles="1" noChangeArrowheads="1" noChangeShapeType="1" noTextEdit="1"/>
+              </p:cNvSpPr>
+              <p:nvPr/>
+            </p:nvSpPr>
+            <p:spPr>
+              <a:xfrm>
+                <a:off x="3762361" y="2867793"/>
+                <a:ext cx="466912" cy="261610"/>
+              </a:xfrm>
+              <a:prstGeom prst="rect">
+                <a:avLst/>
+              </a:prstGeom>
+              <a:blipFill>
+                <a:blip r:embed="rId7"/>
+                <a:stretch>
+                  <a:fillRect/>
+                </a:stretch>
+              </a:blipFill>
+              <a:ln w="12700">
+                <a:noFill/>
+              </a:ln>
+            </p:spPr>
+            <p:txBody>
+              <a:bodyPr/>
+              <a:lstStyle/>
+              <a:p>
+                <a:r>
+                  <a:rPr lang="en-US">
+                    <a:noFill/>
+                  </a:rPr>
+                  <a:t> </a:t>
+                </a:r>
+              </a:p>
+            </p:txBody>
+          </p:sp>
+        </mc:Fallback>
+      </mc:AlternateContent>
+      <mc:AlternateContent xmlns:mc="http://schemas.openxmlformats.org/markup-compatibility/2006">
+        <mc:Choice xmlns:a14="http://schemas.microsoft.com/office/drawing/2010/main" Requires="a14">
+          <p:sp>
+            <p:nvSpPr>
+              <p:cNvPr id="16" name="TextBox 15">
+                <a:extLst>
+                  <a:ext uri="{FF2B5EF4-FFF2-40B4-BE49-F238E27FC236}">
+                    <a16:creationId xmlns:a16="http://schemas.microsoft.com/office/drawing/2014/main" id="{9D4CC7B3-B551-4E20-ACC7-D368A7A5D906}"/>
+                  </a:ext>
+                </a:extLst>
+              </p:cNvPr>
+              <p:cNvSpPr txBox="1"/>
+              <p:nvPr/>
+            </p:nvSpPr>
+            <p:spPr>
+              <a:xfrm>
+                <a:off x="3051016" y="2568442"/>
+                <a:ext cx="317990" cy="327754"/>
+              </a:xfrm>
+              <a:prstGeom prst="rect">
+                <a:avLst/>
+              </a:prstGeom>
               <a:noFill/>
-            </a:ln>
-          </p:spPr>
-          <p:txBody>
-            <a:bodyPr wrap="square" rtlCol="0">
-              <a:spAutoFit/>
-            </a:bodyPr>
-            <a:lstStyle/>
-            <a:p>
-              <a:r>
-                <a:rPr lang="en-US" sz="1600" dirty="0"/>
-                <a:t>object 2</a:t>
-              </a:r>
-            </a:p>
-          </p:txBody>
-        </p:sp>
-        <mc:AlternateContent xmlns:mc="http://schemas.openxmlformats.org/markup-compatibility/2006">
-          <mc:Choice xmlns:a14="http://schemas.microsoft.com/office/drawing/2010/main" Requires="a14">
-            <p:sp>
-              <p:nvSpPr>
-                <p:cNvPr id="20" name="TextBox 19">
-                  <a:extLst>
-                    <a:ext uri="{FF2B5EF4-FFF2-40B4-BE49-F238E27FC236}">
-                      <a16:creationId xmlns:a16="http://schemas.microsoft.com/office/drawing/2014/main" id="{3F1B4565-C315-4893-BD40-74F1FFADD145}"/>
-                    </a:ext>
-                  </a:extLst>
-                </p:cNvPr>
-                <p:cNvSpPr txBox="1"/>
-                <p:nvPr/>
-              </p:nvSpPr>
-              <p:spPr>
-                <a:xfrm>
-                  <a:off x="4369649" y="2988923"/>
-                  <a:ext cx="609598" cy="323165"/>
-                </a:xfrm>
-                <a:prstGeom prst="rect">
-                  <a:avLst/>
-                </a:prstGeom>
+              <a:ln w="12700">
                 <a:noFill/>
-                <a:ln w="12700">
-                  <a:noFill/>
-                </a:ln>
-              </p:spPr>
-              <p:txBody>
-                <a:bodyPr wrap="square" rtlCol="0">
-                  <a:spAutoFit/>
-                </a:bodyPr>
-                <a:lstStyle/>
-                <a:p>
-                  <a:pPr/>
-                  <a14:m>
-                    <m:oMathPara xmlns:m="http://schemas.openxmlformats.org/officeDocument/2006/math">
-                      <m:oMathParaPr>
-                        <m:jc m:val="centerGroup"/>
-                      </m:oMathParaPr>
-                      <m:oMath xmlns:m="http://schemas.openxmlformats.org/officeDocument/2006/math">
-                        <m:sSub>
-                          <m:sSubPr>
-                            <m:ctrlPr>
-                              <a:rPr lang="en-US" sz="1500" b="1" i="1" smtClean="0">
-                                <a:latin typeface="Cambria Math" panose="02040503050406030204" pitchFamily="18" charset="0"/>
-                              </a:rPr>
-                            </m:ctrlPr>
-                          </m:sSubPr>
-                          <m:e>
-                            <m:r>
-                              <a:rPr lang="en-US" sz="1500" b="1" i="1" smtClean="0">
-                                <a:latin typeface="Cambria Math" panose="02040503050406030204" pitchFamily="18" charset="0"/>
-                              </a:rPr>
-                              <m:t>𝒎</m:t>
-                            </m:r>
-                          </m:e>
-                          <m:sub>
-                            <m:r>
-                              <a:rPr lang="en-US" sz="1500" b="1" i="1" smtClean="0">
-                                <a:latin typeface="Cambria Math" panose="02040503050406030204" pitchFamily="18" charset="0"/>
-                              </a:rPr>
-                              <m:t>𝟐</m:t>
-                            </m:r>
-                          </m:sub>
-                        </m:sSub>
-                      </m:oMath>
-                    </m:oMathPara>
-                  </a14:m>
-                  <a:endParaRPr lang="en-US" sz="1500" b="1" dirty="0"/>
-                </a:p>
-              </p:txBody>
-            </p:sp>
-          </mc:Choice>
-          <mc:Fallback>
-            <p:sp>
-              <p:nvSpPr>
-                <p:cNvPr id="20" name="TextBox 19">
-                  <a:extLst>
-                    <a:ext uri="{FF2B5EF4-FFF2-40B4-BE49-F238E27FC236}">
-                      <a16:creationId xmlns:a16="http://schemas.microsoft.com/office/drawing/2014/main" id="{3F1B4565-C315-4893-BD40-74F1FFADD145}"/>
-                    </a:ext>
-                  </a:extLst>
-                </p:cNvPr>
-                <p:cNvSpPr txBox="1">
-                  <a:spLocks noRot="1" noChangeAspect="1" noMove="1" noResize="1" noEditPoints="1" noAdjustHandles="1" noChangeArrowheads="1" noChangeShapeType="1" noTextEdit="1"/>
-                </p:cNvSpPr>
-                <p:nvPr/>
-              </p:nvSpPr>
-              <p:spPr>
-                <a:xfrm>
-                  <a:off x="4369649" y="2988923"/>
-                  <a:ext cx="609598" cy="323165"/>
-                </a:xfrm>
-                <a:prstGeom prst="rect">
-                  <a:avLst/>
-                </a:prstGeom>
-                <a:blipFill>
-                  <a:blip r:embed="rId4"/>
-                  <a:stretch>
-                    <a:fillRect/>
-                  </a:stretch>
-                </a:blipFill>
-                <a:ln w="12700">
-                  <a:noFill/>
-                </a:ln>
-              </p:spPr>
-              <p:txBody>
-                <a:bodyPr/>
-                <a:lstStyle/>
-                <a:p>
-                  <a:r>
-                    <a:rPr lang="en-US">
-                      <a:noFill/>
-                    </a:rPr>
-                    <a:t> </a:t>
-                  </a:r>
-                </a:p>
-              </p:txBody>
-            </p:sp>
-          </mc:Fallback>
-        </mc:AlternateContent>
-        <mc:AlternateContent xmlns:mc="http://schemas.openxmlformats.org/markup-compatibility/2006">
-          <mc:Choice xmlns:a14="http://schemas.microsoft.com/office/drawing/2010/main" Requires="a14">
-            <p:sp>
-              <p:nvSpPr>
-                <p:cNvPr id="16" name="TextBox 15">
-                  <a:extLst>
-                    <a:ext uri="{FF2B5EF4-FFF2-40B4-BE49-F238E27FC236}">
-                      <a16:creationId xmlns:a16="http://schemas.microsoft.com/office/drawing/2014/main" id="{9D4CC7B3-B551-4E20-ACC7-D368A7A5D906}"/>
-                    </a:ext>
-                  </a:extLst>
-                </p:cNvPr>
-                <p:cNvSpPr txBox="1"/>
-                <p:nvPr/>
-              </p:nvSpPr>
-              <p:spPr>
-                <a:xfrm>
-                  <a:off x="3255032" y="2609431"/>
-                  <a:ext cx="415166" cy="369332"/>
-                </a:xfrm>
-                <a:prstGeom prst="rect">
-                  <a:avLst/>
-                </a:prstGeom>
+              </a:ln>
+            </p:spPr>
+            <p:txBody>
+              <a:bodyPr wrap="square" rtlCol="0">
+                <a:spAutoFit/>
+              </a:bodyPr>
+              <a:lstStyle/>
+              <a:p>
+                <a:pPr/>
+                <a14:m>
+                  <m:oMathPara xmlns:m="http://schemas.openxmlformats.org/officeDocument/2006/math">
+                    <m:oMathParaPr>
+                      <m:jc m:val="centerGroup"/>
+                    </m:oMathParaPr>
+                    <m:oMath xmlns:m="http://schemas.openxmlformats.org/officeDocument/2006/math">
+                      <m:acc>
+                        <m:accPr>
+                          <m:chr m:val="⃗"/>
+                          <m:ctrlPr>
+                            <a:rPr lang="en-US" sz="1200" b="0" i="1" smtClean="0">
+                              <a:latin typeface="Cambria Math" panose="02040503050406030204" pitchFamily="18" charset="0"/>
+                            </a:rPr>
+                          </m:ctrlPr>
+                        </m:accPr>
+                        <m:e>
+                          <m:r>
+                            <a:rPr lang="en-US" sz="1200" b="0" i="1" smtClean="0">
+                              <a:latin typeface="Cambria Math"/>
+                            </a:rPr>
+                            <m:t>𝑣</m:t>
+                          </m:r>
+                        </m:e>
+                      </m:acc>
+                    </m:oMath>
+                  </m:oMathPara>
+                </a14:m>
+                <a:endParaRPr lang="en-US" sz="1200" dirty="0"/>
+              </a:p>
+            </p:txBody>
+          </p:sp>
+        </mc:Choice>
+        <mc:Fallback>
+          <p:sp>
+            <p:nvSpPr>
+              <p:cNvPr id="16" name="TextBox 15">
+                <a:extLst>
+                  <a:ext uri="{FF2B5EF4-FFF2-40B4-BE49-F238E27FC236}">
+                    <a16:creationId xmlns:a16="http://schemas.microsoft.com/office/drawing/2014/main" id="{9D4CC7B3-B551-4E20-ACC7-D368A7A5D906}"/>
+                  </a:ext>
+                </a:extLst>
+              </p:cNvPr>
+              <p:cNvSpPr txBox="1">
+                <a:spLocks noRot="1" noChangeAspect="1" noMove="1" noResize="1" noEditPoints="1" noAdjustHandles="1" noChangeArrowheads="1" noChangeShapeType="1" noTextEdit="1"/>
+              </p:cNvSpPr>
+              <p:nvPr/>
+            </p:nvSpPr>
+            <p:spPr>
+              <a:xfrm>
+                <a:off x="3051016" y="2568442"/>
+                <a:ext cx="317990" cy="327754"/>
+              </a:xfrm>
+              <a:prstGeom prst="rect">
+                <a:avLst/>
+              </a:prstGeom>
+              <a:blipFill>
+                <a:blip r:embed="rId8"/>
+                <a:stretch>
+                  <a:fillRect t="-1852" r="-5660"/>
+                </a:stretch>
+              </a:blipFill>
+              <a:ln w="12700">
                 <a:noFill/>
-                <a:ln w="12700">
-                  <a:noFill/>
-                </a:ln>
-              </p:spPr>
-              <p:txBody>
-                <a:bodyPr wrap="square" rtlCol="0">
-                  <a:spAutoFit/>
-                </a:bodyPr>
-                <a:lstStyle/>
-                <a:p>
-                  <a:pPr/>
-                  <a14:m>
-                    <m:oMathPara xmlns:m="http://schemas.openxmlformats.org/officeDocument/2006/math">
-                      <m:oMathParaPr>
-                        <m:jc m:val="centerGroup"/>
-                      </m:oMathParaPr>
-                      <m:oMath xmlns:m="http://schemas.openxmlformats.org/officeDocument/2006/math">
-                        <m:acc>
-                          <m:accPr>
-                            <m:chr m:val="⃗"/>
-                            <m:ctrlPr>
-                              <a:rPr lang="en-US" b="0" i="1" smtClean="0">
-                                <a:latin typeface="Cambria Math" panose="02040503050406030204" pitchFamily="18" charset="0"/>
-                              </a:rPr>
-                            </m:ctrlPr>
-                          </m:accPr>
-                          <m:e>
-                            <m:r>
-                              <a:rPr lang="en-US" b="0" i="1" smtClean="0">
-                                <a:latin typeface="Cambria Math"/>
-                              </a:rPr>
-                              <m:t>𝑣</m:t>
-                            </m:r>
-                          </m:e>
-                        </m:acc>
-                      </m:oMath>
-                    </m:oMathPara>
-                  </a14:m>
-                  <a:endParaRPr lang="en-US" dirty="0"/>
-                </a:p>
-              </p:txBody>
-            </p:sp>
-          </mc:Choice>
-          <mc:Fallback>
-            <p:sp>
-              <p:nvSpPr>
-                <p:cNvPr id="16" name="TextBox 15">
-                  <a:extLst>
-                    <a:ext uri="{FF2B5EF4-FFF2-40B4-BE49-F238E27FC236}">
-                      <a16:creationId xmlns:a16="http://schemas.microsoft.com/office/drawing/2014/main" id="{9D4CC7B3-B551-4E20-ACC7-D368A7A5D906}"/>
-                    </a:ext>
-                  </a:extLst>
-                </p:cNvPr>
-                <p:cNvSpPr txBox="1">
-                  <a:spLocks noRot="1" noChangeAspect="1" noMove="1" noResize="1" noEditPoints="1" noAdjustHandles="1" noChangeArrowheads="1" noChangeShapeType="1" noTextEdit="1"/>
-                </p:cNvSpPr>
-                <p:nvPr/>
-              </p:nvSpPr>
-              <p:spPr>
-                <a:xfrm>
-                  <a:off x="3255032" y="2609431"/>
-                  <a:ext cx="415166" cy="369332"/>
-                </a:xfrm>
-                <a:prstGeom prst="rect">
-                  <a:avLst/>
-                </a:prstGeom>
-                <a:blipFill>
-                  <a:blip r:embed="rId5"/>
-                  <a:stretch>
-                    <a:fillRect t="-22951" r="-29412"/>
-                  </a:stretch>
-                </a:blipFill>
-                <a:ln w="12700">
-                  <a:noFill/>
-                </a:ln>
-              </p:spPr>
-              <p:txBody>
-                <a:bodyPr/>
-                <a:lstStyle/>
-                <a:p>
-                  <a:r>
-                    <a:rPr lang="en-US">
-                      <a:noFill/>
-                    </a:rPr>
-                    <a:t> </a:t>
-                  </a:r>
-                </a:p>
-              </p:txBody>
-            </p:sp>
-          </mc:Fallback>
-        </mc:AlternateContent>
-        <mc:AlternateContent xmlns:mc="http://schemas.openxmlformats.org/markup-compatibility/2006">
-          <mc:Choice xmlns:a14="http://schemas.microsoft.com/office/drawing/2010/main" Requires="a14">
-            <p:sp>
-              <p:nvSpPr>
-                <p:cNvPr id="21" name="TextBox 20">
-                  <a:extLst>
-                    <a:ext uri="{FF2B5EF4-FFF2-40B4-BE49-F238E27FC236}">
-                      <a16:creationId xmlns:a16="http://schemas.microsoft.com/office/drawing/2014/main" id="{DDB582E3-FA0E-4B41-A781-A29BB41FADEC}"/>
-                    </a:ext>
-                  </a:extLst>
-                </p:cNvPr>
-                <p:cNvSpPr txBox="1"/>
-                <p:nvPr/>
-              </p:nvSpPr>
-              <p:spPr>
-                <a:xfrm>
-                  <a:off x="3872263" y="2611253"/>
-                  <a:ext cx="415166" cy="369332"/>
-                </a:xfrm>
-                <a:prstGeom prst="rect">
-                  <a:avLst/>
-                </a:prstGeom>
+              </a:ln>
+            </p:spPr>
+            <p:txBody>
+              <a:bodyPr/>
+              <a:lstStyle/>
+              <a:p>
+                <a:r>
+                  <a:rPr lang="en-US">
+                    <a:noFill/>
+                  </a:rPr>
+                  <a:t> </a:t>
+                </a:r>
+              </a:p>
+            </p:txBody>
+          </p:sp>
+        </mc:Fallback>
+      </mc:AlternateContent>
+      <mc:AlternateContent xmlns:mc="http://schemas.openxmlformats.org/markup-compatibility/2006">
+        <mc:Choice xmlns:a14="http://schemas.microsoft.com/office/drawing/2010/main" Requires="a14">
+          <p:sp>
+            <p:nvSpPr>
+              <p:cNvPr id="21" name="TextBox 20">
+                <a:extLst>
+                  <a:ext uri="{FF2B5EF4-FFF2-40B4-BE49-F238E27FC236}">
+                    <a16:creationId xmlns:a16="http://schemas.microsoft.com/office/drawing/2014/main" id="{DDB582E3-FA0E-4B41-A781-A29BB41FADEC}"/>
+                  </a:ext>
+                </a:extLst>
+              </p:cNvPr>
+              <p:cNvSpPr txBox="1"/>
+              <p:nvPr/>
+            </p:nvSpPr>
+            <p:spPr>
+              <a:xfrm>
+                <a:off x="3310072" y="2569000"/>
+                <a:ext cx="317990" cy="327754"/>
+              </a:xfrm>
+              <a:prstGeom prst="rect">
+                <a:avLst/>
+              </a:prstGeom>
+              <a:noFill/>
+              <a:ln w="12700">
                 <a:noFill/>
-                <a:ln w="12700">
-                  <a:noFill/>
-                </a:ln>
-              </p:spPr>
-              <p:txBody>
-                <a:bodyPr wrap="square" rtlCol="0">
-                  <a:spAutoFit/>
-                </a:bodyPr>
-                <a:lstStyle/>
-                <a:p>
-                  <a:pPr/>
-                  <a14:m>
-                    <m:oMathPara xmlns:m="http://schemas.openxmlformats.org/officeDocument/2006/math">
-                      <m:oMathParaPr>
-                        <m:jc m:val="centerGroup"/>
-                      </m:oMathParaPr>
-                      <m:oMath xmlns:m="http://schemas.openxmlformats.org/officeDocument/2006/math">
-                        <m:r>
-                          <a:rPr lang="en-US" b="0" i="1" smtClean="0">
-                            <a:latin typeface="Cambria Math" panose="02040503050406030204" pitchFamily="18" charset="0"/>
-                          </a:rPr>
-                          <m:t>−</m:t>
-                        </m:r>
-                        <m:acc>
-                          <m:accPr>
-                            <m:chr m:val="⃗"/>
-                            <m:ctrlPr>
-                              <a:rPr lang="en-US" b="0" i="1" smtClean="0">
-                                <a:latin typeface="Cambria Math" panose="02040503050406030204" pitchFamily="18" charset="0"/>
-                              </a:rPr>
-                            </m:ctrlPr>
-                          </m:accPr>
-                          <m:e>
-                            <m:r>
-                              <a:rPr lang="en-US" b="0" i="1" smtClean="0">
-                                <a:latin typeface="Cambria Math"/>
-                              </a:rPr>
-                              <m:t>𝑣</m:t>
-                            </m:r>
-                          </m:e>
-                        </m:acc>
-                      </m:oMath>
-                    </m:oMathPara>
-                  </a14:m>
-                  <a:endParaRPr lang="en-US" dirty="0"/>
-                </a:p>
-              </p:txBody>
-            </p:sp>
-          </mc:Choice>
-          <mc:Fallback>
-            <p:sp>
-              <p:nvSpPr>
-                <p:cNvPr id="21" name="TextBox 20">
-                  <a:extLst>
-                    <a:ext uri="{FF2B5EF4-FFF2-40B4-BE49-F238E27FC236}">
-                      <a16:creationId xmlns:a16="http://schemas.microsoft.com/office/drawing/2014/main" id="{DDB582E3-FA0E-4B41-A781-A29BB41FADEC}"/>
-                    </a:ext>
-                  </a:extLst>
-                </p:cNvPr>
-                <p:cNvSpPr txBox="1">
-                  <a:spLocks noRot="1" noChangeAspect="1" noMove="1" noResize="1" noEditPoints="1" noAdjustHandles="1" noChangeArrowheads="1" noChangeShapeType="1" noTextEdit="1"/>
-                </p:cNvSpPr>
-                <p:nvPr/>
-              </p:nvSpPr>
-              <p:spPr>
-                <a:xfrm>
-                  <a:off x="3872263" y="2611253"/>
-                  <a:ext cx="415166" cy="369332"/>
-                </a:xfrm>
-                <a:prstGeom prst="rect">
-                  <a:avLst/>
-                </a:prstGeom>
-                <a:blipFill>
-                  <a:blip r:embed="rId6"/>
-                  <a:stretch>
-                    <a:fillRect t="-22951" r="-60294"/>
-                  </a:stretch>
-                </a:blipFill>
-                <a:ln w="12700">
-                  <a:noFill/>
-                </a:ln>
-              </p:spPr>
-              <p:txBody>
-                <a:bodyPr/>
-                <a:lstStyle/>
-                <a:p>
-                  <a:r>
-                    <a:rPr lang="en-US">
-                      <a:noFill/>
-                    </a:rPr>
-                    <a:t> </a:t>
-                  </a:r>
-                </a:p>
-              </p:txBody>
-            </p:sp>
-          </mc:Fallback>
-        </mc:AlternateContent>
-        <p:cxnSp>
-          <p:nvCxnSpPr>
-            <p:cNvPr id="22" name="Straight Arrow Connector 21">
-              <a:extLst>
-                <a:ext uri="{FF2B5EF4-FFF2-40B4-BE49-F238E27FC236}">
-                  <a16:creationId xmlns:a16="http://schemas.microsoft.com/office/drawing/2014/main" id="{167C426C-68FB-40C8-B0F0-206EFB21DBFA}"/>
-                </a:ext>
-              </a:extLst>
-            </p:cNvPr>
-            <p:cNvCxnSpPr>
-              <a:cxnSpLocks/>
-            </p:cNvCxnSpPr>
-            <p:nvPr/>
-          </p:nvCxnSpPr>
-          <p:spPr>
-            <a:xfrm>
-              <a:off x="3846898" y="2977638"/>
-              <a:ext cx="485225" cy="0"/>
-            </a:xfrm>
-            <a:prstGeom prst="straightConnector1">
-              <a:avLst/>
-            </a:prstGeom>
-            <a:ln w="19050">
-              <a:solidFill>
-                <a:schemeClr val="tx1"/>
-              </a:solidFill>
-              <a:headEnd type="triangle" w="lg" len="lg"/>
-              <a:tailEnd type="none" w="lg" len="lg"/>
-            </a:ln>
-          </p:spPr>
-          <p:style>
-            <a:lnRef idx="1">
-              <a:schemeClr val="accent1"/>
-            </a:lnRef>
-            <a:fillRef idx="0">
-              <a:schemeClr val="accent1"/>
-            </a:fillRef>
-            <a:effectRef idx="0">
-              <a:schemeClr val="accent1"/>
-            </a:effectRef>
-            <a:fontRef idx="minor">
+              </a:ln>
+            </p:spPr>
+            <p:txBody>
+              <a:bodyPr wrap="square" rtlCol="0">
+                <a:spAutoFit/>
+              </a:bodyPr>
+              <a:lstStyle/>
+              <a:p>
+                <a:pPr/>
+                <a14:m>
+                  <m:oMathPara xmlns:m="http://schemas.openxmlformats.org/officeDocument/2006/math">
+                    <m:oMathParaPr>
+                      <m:jc m:val="centerGroup"/>
+                    </m:oMathParaPr>
+                    <m:oMath xmlns:m="http://schemas.openxmlformats.org/officeDocument/2006/math">
+                      <m:r>
+                        <a:rPr lang="en-US" sz="1200" b="0" i="1" smtClean="0">
+                          <a:latin typeface="Cambria Math" panose="02040503050406030204" pitchFamily="18" charset="0"/>
+                        </a:rPr>
+                        <m:t>−</m:t>
+                      </m:r>
+                      <m:acc>
+                        <m:accPr>
+                          <m:chr m:val="⃗"/>
+                          <m:ctrlPr>
+                            <a:rPr lang="en-US" sz="1200" b="0" i="1" smtClean="0">
+                              <a:latin typeface="Cambria Math" panose="02040503050406030204" pitchFamily="18" charset="0"/>
+                            </a:rPr>
+                          </m:ctrlPr>
+                        </m:accPr>
+                        <m:e>
+                          <m:r>
+                            <a:rPr lang="en-US" sz="1200" b="0" i="1" smtClean="0">
+                              <a:latin typeface="Cambria Math"/>
+                            </a:rPr>
+                            <m:t>𝑣</m:t>
+                          </m:r>
+                        </m:e>
+                      </m:acc>
+                    </m:oMath>
+                  </m:oMathPara>
+                </a14:m>
+                <a:endParaRPr lang="en-US" sz="1200" dirty="0"/>
+              </a:p>
+            </p:txBody>
+          </p:sp>
+        </mc:Choice>
+        <mc:Fallback>
+          <p:sp>
+            <p:nvSpPr>
+              <p:cNvPr id="21" name="TextBox 20">
+                <a:extLst>
+                  <a:ext uri="{FF2B5EF4-FFF2-40B4-BE49-F238E27FC236}">
+                    <a16:creationId xmlns:a16="http://schemas.microsoft.com/office/drawing/2014/main" id="{DDB582E3-FA0E-4B41-A781-A29BB41FADEC}"/>
+                  </a:ext>
+                </a:extLst>
+              </p:cNvPr>
+              <p:cNvSpPr txBox="1">
+                <a:spLocks noRot="1" noChangeAspect="1" noMove="1" noResize="1" noEditPoints="1" noAdjustHandles="1" noChangeArrowheads="1" noChangeShapeType="1" noTextEdit="1"/>
+              </p:cNvSpPr>
+              <p:nvPr/>
+            </p:nvSpPr>
+            <p:spPr>
+              <a:xfrm>
+                <a:off x="3310072" y="2569000"/>
+                <a:ext cx="317990" cy="327754"/>
+              </a:xfrm>
+              <a:prstGeom prst="rect">
+                <a:avLst/>
+              </a:prstGeom>
+              <a:blipFill>
+                <a:blip r:embed="rId9"/>
+                <a:stretch>
+                  <a:fillRect t="-1852" r="-34615"/>
+                </a:stretch>
+              </a:blipFill>
+              <a:ln w="12700">
+                <a:noFill/>
+              </a:ln>
+            </p:spPr>
+            <p:txBody>
+              <a:bodyPr/>
+              <a:lstStyle/>
+              <a:p>
+                <a:r>
+                  <a:rPr lang="en-US">
+                    <a:noFill/>
+                  </a:rPr>
+                  <a:t> </a:t>
+                </a:r>
+              </a:p>
+            </p:txBody>
+          </p:sp>
+        </mc:Fallback>
+      </mc:AlternateContent>
+      <p:cxnSp>
+        <p:nvCxnSpPr>
+          <p:cNvPr id="22" name="Straight Arrow Connector 21">
+            <a:extLst>
+              <a:ext uri="{FF2B5EF4-FFF2-40B4-BE49-F238E27FC236}">
+                <a16:creationId xmlns:a16="http://schemas.microsoft.com/office/drawing/2014/main" id="{167C426C-68FB-40C8-B0F0-206EFB21DBFA}"/>
+              </a:ext>
+            </a:extLst>
+          </p:cNvPr>
+          <p:cNvCxnSpPr>
+            <a:cxnSpLocks/>
+          </p:cNvCxnSpPr>
+          <p:nvPr/>
+        </p:nvCxnSpPr>
+        <p:spPr>
+          <a:xfrm>
+            <a:off x="3392449" y="2859150"/>
+            <a:ext cx="371650" cy="0"/>
+          </a:xfrm>
+          <a:prstGeom prst="straightConnector1">
+            <a:avLst/>
+          </a:prstGeom>
+          <a:ln w="19050">
+            <a:solidFill>
               <a:schemeClr val="tx1"/>
-            </a:fontRef>
-          </p:style>
-        </p:cxnSp>
-      </p:grpSp>
+            </a:solidFill>
+            <a:headEnd type="arrow" w="med" len="med"/>
+            <a:tailEnd type="none" w="med" len="med"/>
+          </a:ln>
+        </p:spPr>
+        <p:style>
+          <a:lnRef idx="1">
+            <a:schemeClr val="accent1"/>
+          </a:lnRef>
+          <a:fillRef idx="0">
+            <a:schemeClr val="accent1"/>
+          </a:fillRef>
+          <a:effectRef idx="0">
+            <a:schemeClr val="accent1"/>
+          </a:effectRef>
+          <a:fontRef idx="minor">
+            <a:schemeClr val="tx1"/>
+          </a:fontRef>
+        </p:style>
+      </p:cxnSp>
     </p:spTree>
     <p:extLst>
       <p:ext uri="{BB962C8B-B14F-4D97-AF65-F5344CB8AC3E}">
@@ -3867,6 +4284,13 @@
   <p:clrMapOvr>
     <a:masterClrMapping/>
   </p:clrMapOvr>
+  <p:timing>
+    <p:tnLst>
+      <p:par>
+        <p:cTn id="1" dur="indefinite" restart="never" nodeType="tmRoot"/>
+      </p:par>
+    </p:tnLst>
+  </p:timing>
 </p:sld>
 </file>
 
@@ -4153,4 +4577,265 @@
   <a:objectDefaults/>
   <a:extraClrSchemeLst/>
 </a:theme>
+</file>
+
+<file path=ppt/theme/theme2.xml><?xml version="1.0" encoding="utf-8"?>
+<a:theme xmlns:a="http://schemas.openxmlformats.org/drawingml/2006/main" name="Office Theme">
+  <a:themeElements>
+    <a:clrScheme name="Office">
+      <a:dk1>
+        <a:sysClr val="windowText" lastClr="000000"/>
+      </a:dk1>
+      <a:lt1>
+        <a:sysClr val="window" lastClr="FFFFFF"/>
+      </a:lt1>
+      <a:dk2>
+        <a:srgbClr val="44546A"/>
+      </a:dk2>
+      <a:lt2>
+        <a:srgbClr val="E7E6E6"/>
+      </a:lt2>
+      <a:accent1>
+        <a:srgbClr val="5B9BD5"/>
+      </a:accent1>
+      <a:accent2>
+        <a:srgbClr val="ED7D31"/>
+      </a:accent2>
+      <a:accent3>
+        <a:srgbClr val="A5A5A5"/>
+      </a:accent3>
+      <a:accent4>
+        <a:srgbClr val="FFC000"/>
+      </a:accent4>
+      <a:accent5>
+        <a:srgbClr val="4472C4"/>
+      </a:accent5>
+      <a:accent6>
+        <a:srgbClr val="70AD47"/>
+      </a:accent6>
+      <a:hlink>
+        <a:srgbClr val="0563C1"/>
+      </a:hlink>
+      <a:folHlink>
+        <a:srgbClr val="954F72"/>
+      </a:folHlink>
+    </a:clrScheme>
+    <a:fontScheme name="Office">
+      <a:majorFont>
+        <a:latin typeface="Calibri Light" panose="020F0302020204030204"/>
+        <a:ea typeface=""/>
+        <a:cs typeface=""/>
+        <a:font script="Jpan" typeface="游ゴシック Light"/>
+        <a:font script="Hang" typeface="맑은 고딕"/>
+        <a:font script="Hans" typeface="等线 Light"/>
+        <a:font script="Hant" typeface="新細明體"/>
+        <a:font script="Arab" typeface="Times New Roman"/>
+        <a:font script="Hebr" typeface="Times New Roman"/>
+        <a:font script="Thai" typeface="Angsana New"/>
+        <a:font script="Ethi" typeface="Nyala"/>
+        <a:font script="Beng" typeface="Vrinda"/>
+        <a:font script="Gujr" typeface="Shruti"/>
+        <a:font script="Khmr" typeface="MoolBoran"/>
+        <a:font script="Knda" typeface="Tunga"/>
+        <a:font script="Guru" typeface="Raavi"/>
+        <a:font script="Cans" typeface="Euphemia"/>
+        <a:font script="Cher" typeface="Plantagenet Cherokee"/>
+        <a:font script="Yiii" typeface="Microsoft Yi Baiti"/>
+        <a:font script="Tibt" typeface="Microsoft Himalaya"/>
+        <a:font script="Thaa" typeface="MV Boli"/>
+        <a:font script="Deva" typeface="Mangal"/>
+        <a:font script="Telu" typeface="Gautami"/>
+        <a:font script="Taml" typeface="Latha"/>
+        <a:font script="Syrc" typeface="Estrangelo Edessa"/>
+        <a:font script="Orya" typeface="Kalinga"/>
+        <a:font script="Mlym" typeface="Kartika"/>
+        <a:font script="Laoo" typeface="DokChampa"/>
+        <a:font script="Sinh" typeface="Iskoola Pota"/>
+        <a:font script="Mong" typeface="Mongolian Baiti"/>
+        <a:font script="Viet" typeface="Times New Roman"/>
+        <a:font script="Uigh" typeface="Microsoft Uighur"/>
+        <a:font script="Geor" typeface="Sylfaen"/>
+      </a:majorFont>
+      <a:minorFont>
+        <a:latin typeface="Calibri" panose="020F0502020204030204"/>
+        <a:ea typeface=""/>
+        <a:cs typeface=""/>
+        <a:font script="Jpan" typeface="游ゴシック"/>
+        <a:font script="Hang" typeface="맑은 고딕"/>
+        <a:font script="Hans" typeface="等线"/>
+        <a:font script="Hant" typeface="新細明體"/>
+        <a:font script="Arab" typeface="Arial"/>
+        <a:font script="Hebr" typeface="Arial"/>
+        <a:font script="Thai" typeface="Cordia New"/>
+        <a:font script="Ethi" typeface="Nyala"/>
+        <a:font script="Beng" typeface="Vrinda"/>
+        <a:font script="Gujr" typeface="Shruti"/>
+        <a:font script="Khmr" typeface="DaunPenh"/>
+        <a:font script="Knda" typeface="Tunga"/>
+        <a:font script="Guru" typeface="Raavi"/>
+        <a:font script="Cans" typeface="Euphemia"/>
+        <a:font script="Cher" typeface="Plantagenet Cherokee"/>
+        <a:font script="Yiii" typeface="Microsoft Yi Baiti"/>
+        <a:font script="Tibt" typeface="Microsoft Himalaya"/>
+        <a:font script="Thaa" typeface="MV Boli"/>
+        <a:font script="Deva" typeface="Mangal"/>
+        <a:font script="Telu" typeface="Gautami"/>
+        <a:font script="Taml" typeface="Latha"/>
+        <a:font script="Syrc" typeface="Estrangelo Edessa"/>
+        <a:font script="Orya" typeface="Kalinga"/>
+        <a:font script="Mlym" typeface="Kartika"/>
+        <a:font script="Laoo" typeface="DokChampa"/>
+        <a:font script="Sinh" typeface="Iskoola Pota"/>
+        <a:font script="Mong" typeface="Mongolian Baiti"/>
+        <a:font script="Viet" typeface="Arial"/>
+        <a:font script="Uigh" typeface="Microsoft Uighur"/>
+        <a:font script="Geor" typeface="Sylfaen"/>
+      </a:minorFont>
+    </a:fontScheme>
+    <a:fmtScheme name="Office">
+      <a:fillStyleLst>
+        <a:solidFill>
+          <a:schemeClr val="phClr"/>
+        </a:solidFill>
+        <a:gradFill rotWithShape="1">
+          <a:gsLst>
+            <a:gs pos="0">
+              <a:schemeClr val="phClr">
+                <a:lumMod val="110000"/>
+                <a:satMod val="105000"/>
+                <a:tint val="67000"/>
+              </a:schemeClr>
+            </a:gs>
+            <a:gs pos="50000">
+              <a:schemeClr val="phClr">
+                <a:lumMod val="105000"/>
+                <a:satMod val="103000"/>
+                <a:tint val="73000"/>
+              </a:schemeClr>
+            </a:gs>
+            <a:gs pos="100000">
+              <a:schemeClr val="phClr">
+                <a:lumMod val="105000"/>
+                <a:satMod val="109000"/>
+                <a:tint val="81000"/>
+              </a:schemeClr>
+            </a:gs>
+          </a:gsLst>
+          <a:lin ang="5400000" scaled="0"/>
+        </a:gradFill>
+        <a:gradFill rotWithShape="1">
+          <a:gsLst>
+            <a:gs pos="0">
+              <a:schemeClr val="phClr">
+                <a:satMod val="103000"/>
+                <a:lumMod val="102000"/>
+                <a:tint val="94000"/>
+              </a:schemeClr>
+            </a:gs>
+            <a:gs pos="50000">
+              <a:schemeClr val="phClr">
+                <a:satMod val="110000"/>
+                <a:lumMod val="100000"/>
+                <a:shade val="100000"/>
+              </a:schemeClr>
+            </a:gs>
+            <a:gs pos="100000">
+              <a:schemeClr val="phClr">
+                <a:lumMod val="99000"/>
+                <a:satMod val="120000"/>
+                <a:shade val="78000"/>
+              </a:schemeClr>
+            </a:gs>
+          </a:gsLst>
+          <a:lin ang="5400000" scaled="0"/>
+        </a:gradFill>
+      </a:fillStyleLst>
+      <a:lnStyleLst>
+        <a:ln w="6350" cap="flat" cmpd="sng" algn="ctr">
+          <a:solidFill>
+            <a:schemeClr val="phClr"/>
+          </a:solidFill>
+          <a:prstDash val="solid"/>
+          <a:miter lim="800000"/>
+        </a:ln>
+        <a:ln w="12700" cap="flat" cmpd="sng" algn="ctr">
+          <a:solidFill>
+            <a:schemeClr val="phClr"/>
+          </a:solidFill>
+          <a:prstDash val="solid"/>
+          <a:miter lim="800000"/>
+        </a:ln>
+        <a:ln w="19050" cap="flat" cmpd="sng" algn="ctr">
+          <a:solidFill>
+            <a:schemeClr val="phClr"/>
+          </a:solidFill>
+          <a:prstDash val="solid"/>
+          <a:miter lim="800000"/>
+        </a:ln>
+      </a:lnStyleLst>
+      <a:effectStyleLst>
+        <a:effectStyle>
+          <a:effectLst/>
+        </a:effectStyle>
+        <a:effectStyle>
+          <a:effectLst/>
+        </a:effectStyle>
+        <a:effectStyle>
+          <a:effectLst>
+            <a:outerShdw blurRad="57150" dist="19050" dir="5400000" algn="ctr" rotWithShape="0">
+              <a:srgbClr val="000000">
+                <a:alpha val="63000"/>
+              </a:srgbClr>
+            </a:outerShdw>
+          </a:effectLst>
+        </a:effectStyle>
+      </a:effectStyleLst>
+      <a:bgFillStyleLst>
+        <a:solidFill>
+          <a:schemeClr val="phClr"/>
+        </a:solidFill>
+        <a:solidFill>
+          <a:schemeClr val="phClr">
+            <a:tint val="95000"/>
+            <a:satMod val="170000"/>
+          </a:schemeClr>
+        </a:solidFill>
+        <a:gradFill rotWithShape="1">
+          <a:gsLst>
+            <a:gs pos="0">
+              <a:schemeClr val="phClr">
+                <a:tint val="93000"/>
+                <a:satMod val="150000"/>
+                <a:shade val="98000"/>
+                <a:lumMod val="102000"/>
+              </a:schemeClr>
+            </a:gs>
+            <a:gs pos="50000">
+              <a:schemeClr val="phClr">
+                <a:tint val="98000"/>
+                <a:satMod val="130000"/>
+                <a:shade val="90000"/>
+                <a:lumMod val="103000"/>
+              </a:schemeClr>
+            </a:gs>
+            <a:gs pos="100000">
+              <a:schemeClr val="phClr">
+                <a:shade val="63000"/>
+                <a:satMod val="120000"/>
+              </a:schemeClr>
+            </a:gs>
+          </a:gsLst>
+          <a:lin ang="5400000" scaled="0"/>
+        </a:gradFill>
+      </a:bgFillStyleLst>
+    </a:fmtScheme>
+  </a:themeElements>
+  <a:objectDefaults/>
+  <a:extraClrSchemeLst/>
+  <a:extLst>
+    <a:ext uri="{05A4C25C-085E-4340-85A3-A5531E510DB2}">
+      <thm15:themeFamily xmlns:thm15="http://schemas.microsoft.com/office/thememl/2012/main" name="Office Theme" id="{62F939B6-93AF-4DB8-9C6B-D6C7DFDC589F}" vid="{4A3C46E8-61CC-4603-A589-7422A47A8E4A}"/>
+    </a:ext>
+  </a:extLst>
+</a:theme>
 </file>
</xml_diff>